<commit_message>
published topic 4 without video links
</commit_message>
<xml_diff>
--- a/topic-4/talk-3/ReactJS_04.pptx
+++ b/topic-4/talk-3/ReactJS_04.pptx
@@ -199,6 +199,174 @@
     </inkml:brush>
   </inkml:definitions>
   <inkml:trace contextRef="#ctx0" brushRef="#br0">16138 6606 24575,'0'0'0</inkml:trace>
+</inkml:ink>
+</file>
+
+<file path=ppt/ink/ink2.xml><?xml version="1.0" encoding="utf-8"?>
+<inkml:ink xmlns:inkml="http://www.w3.org/2003/InkML">
+  <inkml:definitions>
+    <inkml:context xml:id="ctx0">
+      <inkml:inkSource xml:id="inkSrc0">
+        <inkml:traceFormat>
+          <inkml:channel name="X" type="integer" min="-2.14748E9" max="2.14748E9" units="cm"/>
+          <inkml:channel name="Y" type="integer" min="-2.14748E9" max="2.14748E9" units="cm"/>
+          <inkml:channel name="F" type="integer" max="32767" units="dev"/>
+        </inkml:traceFormat>
+        <inkml:channelProperties>
+          <inkml:channelProperty channel="X" name="resolution" value="1000" units="1/cm"/>
+          <inkml:channelProperty channel="Y" name="resolution" value="1000" units="1/cm"/>
+          <inkml:channelProperty channel="F" name="resolution" value="0" units="1/dev"/>
+        </inkml:channelProperties>
+      </inkml:inkSource>
+      <inkml:timestamp xml:id="ts0" timeString="2024-06-05T13:01:21.337"/>
+    </inkml:context>
+    <inkml:brush xml:id="br0">
+      <inkml:brushProperty name="width" value="0.05" units="cm"/>
+      <inkml:brushProperty name="height" value="0.05" units="cm"/>
+      <inkml:brushProperty name="color" value="#E71224"/>
+    </inkml:brush>
+  </inkml:definitions>
+  <inkml:trace contextRef="#ctx0" brushRef="#br0">4 1 24575,'-3'0'0</inkml:trace>
+</inkml:ink>
+</file>
+
+<file path=ppt/ink/ink3.xml><?xml version="1.0" encoding="utf-8"?>
+<inkml:ink xmlns:inkml="http://www.w3.org/2003/InkML">
+  <inkml:definitions>
+    <inkml:context xml:id="ctx0">
+      <inkml:inkSource xml:id="inkSrc0">
+        <inkml:traceFormat>
+          <inkml:channel name="X" type="integer" min="-2.14748E9" max="2.14748E9" units="cm"/>
+          <inkml:channel name="Y" type="integer" min="-2.14748E9" max="2.14748E9" units="cm"/>
+          <inkml:channel name="F" type="integer" max="32767" units="dev"/>
+        </inkml:traceFormat>
+        <inkml:channelProperties>
+          <inkml:channelProperty channel="X" name="resolution" value="1000" units="1/cm"/>
+          <inkml:channelProperty channel="Y" name="resolution" value="1000" units="1/cm"/>
+          <inkml:channelProperty channel="F" name="resolution" value="0" units="1/dev"/>
+        </inkml:channelProperties>
+      </inkml:inkSource>
+      <inkml:timestamp xml:id="ts0" timeString="2024-06-05T13:01:28.035"/>
+    </inkml:context>
+    <inkml:brush xml:id="br0">
+      <inkml:brushProperty name="width" value="0.05" units="cm"/>
+      <inkml:brushProperty name="height" value="0.05" units="cm"/>
+      <inkml:brushProperty name="color" value="#E71224"/>
+    </inkml:brush>
+  </inkml:definitions>
+  <inkml:trace contextRef="#ctx0" brushRef="#br0">0 3785 24575,'6'-1'0,"0"-1"0,0 1 0,0-1 0,0 0 0,-1-1 0,1 1 0,-1-1 0,0 0 0,6-5 0,9-3 0,189-105 0,131-66 0,-233 132 0,207-102 0,-221 101 0,112-80 0,9-18 0,108-82 0,-238 173 0,1 3 0,111-53 0,-177 99 0,4-1 0,0 0 0,1 2 0,40-9 0,-30 9 0,33-13 0,267-114 0,-226 87 0,164-103 0,-155 83 0,225-137 0,-188 112 0,219-105 0,-177 94 0,85-40 0,107-31 0,88-67 0,-276 137 0,-59 40 0,-2 1 0,458-196 0,-568 248 0,6-2 0,1 0 0,0 2 0,1 2 0,0 2 0,0 1 0,45-2 0,72 2 0,117-2 0,-109 9 0,435-4 0,-3-36 0,-359 11 0,428-42 0,-661 71 0,388-22 0,-26 5 0,-188 1 0,41-2 0,548 13 0,-422 8 0,1403-3 0,-1473 19 0,-2 22 0,-218-32 0,424 94 0,-260-52 0,-151-37 0,166 41 0,-157-33 0,77 32 0,124 44 0,-7-3 0,-6 11 0,-181-69 0,58 25 0,77 31 0,-135-59 0,84 49 0,-142-71 0,1-1 0,36 10 0,-36-12 0,1 0 0,37 20 0,-26-10 0,62 23 0,-65-30 0,-1 2 0,59 33 0,-28-11 0,-44-26 0,-1 1 0,30 20 0,-24-10 0,27 20 0,26 17 0,-9-5 0,-27-30 0,-31-19 0,-2 1 0,1 0 0,11 9 0,-20-13 0,0-1 0,-1 1 0,1 0 0,-1-1 0,1 1 0,0-1 0,0 1 0,0 0 0,-1-1 0,1 0 0,0 1 0,0-1 0,0 0 0,0 1 0,0-1 0,-1 0 0,1 0 0,0 0 0,0 1 0,0-1 0,0 0 0,0-1 0,0 1 0,0 0 0,0 0 0,0 0 0,0 0 0,0-1 0,0 0 0,0 0 0,0 0 0,0 0 0,-1-1 0,1 1 0,-1 0 0,1 0 0,-1-1 0,1 1 0,-1 0 0,0-1 0,0 1 0,0 0 0,0-1 0,0 1 0,0-2 0,-1-10 0,0 1 0,-6-25 0,2 18 0,-4-21 0,-6-40 0,15 78 0,0 1 0,0 0 0,0 0 0,0 0 0,0 0 0,0 0 0,-1 0 0,1 0 0,0 0 0,-1 0 0,1 0 0,-1 0 0,1 0 0,-1 0 0,0 0 0,1 0 0,-2-1 0,1 3 0,1-1 0,-1 0 0,1 1 0,-1-1 0,1 1 0,-1-1 0,1 0 0,-1 1 0,1-1 0,0 1 0,-1 0 0,1-1 0,0 1 0,-1-1 0,1 1 0,0-1 0,0 1 0,0 0 0,-1-1 0,1 1 0,0 0 0,0-1 0,0 1 0,0 0 0,0-1 0,0 1 0,0 0 0,1 0 0,-2 22 0,1-1 0,1 0 0,6 37 0,-2-30 0,0 41 0,-5-59 0,0-3 0,0 1 0,0-1 0,-1 0 0,0 0 0,-4 15 0,4-21 0,1 0 0,-1 0 0,0 0 0,-1 0 0,1 0 0,0 0 0,-1 0 0,1-1 0,-1 1 0,1 0 0,-1-1 0,0 1 0,1-1 0,-1 0 0,0 0 0,0 0 0,0 1 0,0-2 0,0 1 0,0 0 0,-1 0 0,1-1 0,0 1 0,0-1 0,-5 1 0,-36 1 116,-58-4-1,24 0-1711,60 2-5230</inkml:trace>
+</inkml:ink>
+</file>
+
+<file path=ppt/ink/ink4.xml><?xml version="1.0" encoding="utf-8"?>
+<inkml:ink xmlns:inkml="http://www.w3.org/2003/InkML">
+  <inkml:definitions>
+    <inkml:context xml:id="ctx0">
+      <inkml:inkSource xml:id="inkSrc0">
+        <inkml:traceFormat>
+          <inkml:channel name="X" type="integer" min="-2.14748E9" max="2.14748E9" units="cm"/>
+          <inkml:channel name="Y" type="integer" min="-2.14748E9" max="2.14748E9" units="cm"/>
+          <inkml:channel name="F" type="integer" max="32767" units="dev"/>
+        </inkml:traceFormat>
+        <inkml:channelProperties>
+          <inkml:channelProperty channel="X" name="resolution" value="1000" units="1/cm"/>
+          <inkml:channelProperty channel="Y" name="resolution" value="1000" units="1/cm"/>
+          <inkml:channelProperty channel="F" name="resolution" value="0" units="1/dev"/>
+        </inkml:channelProperties>
+      </inkml:inkSource>
+      <inkml:timestamp xml:id="ts0" timeString="2024-06-05T13:01:32.329"/>
+    </inkml:context>
+    <inkml:brush xml:id="br0">
+      <inkml:brushProperty name="width" value="0.05" units="cm"/>
+      <inkml:brushProperty name="height" value="0.05" units="cm"/>
+      <inkml:brushProperty name="color" value="#E71224"/>
+    </inkml:brush>
+  </inkml:definitions>
+  <inkml:trace contextRef="#ctx0" brushRef="#br0">9722 0 24575,'-1'0'0,"0"1"0,1-1 0,-1 0 0,1 0 0,-1 1 0,0-1 0,1 0 0,-1 1 0,1-1 0,-1 1 0,1-1 0,-1 1 0,1-1 0,-1 1 0,1-1 0,0 1 0,-1-1 0,1 1 0,0-1 0,-1 1 0,1 0 0,0-1 0,-1 2 0,-5 19 0,5-14 0,-11 26 0,-1-1 0,-1 0 0,-31 50 0,-75 99 0,-387 428 0,310-401 0,-9-9 0,-307 231 0,264-269 0,-16-23 0,75-50-72,-3-8 0,-3-8 0,-4-10 0,-2-8-1,-2-9 1,-2-9 0,-324 15 0,-521-48 72,526-8 0,184 7 161,-296-4 255,242-30-416,135 6 0,-1 12 0,-183-18 0,-115-28 0,501 50 0,0-3 0,-80-27 0,24 5 0,72 25 0,17 4 0,1-1 0,-29-13 0,-125-59 0,84 28 0,85 45 0,0 0 0,1 1 0,-1 0 0,0 0 0,0 1 0,-12-4 0,-26-5 0,14 2 0,-1 2 0,-1 1 0,-68-6 0,98 14 0,1 0 0,-1-1 0,0 0 0,1 1 0,-1-2 0,1 1 0,-7-3 0,10 4 0,0-1 0,0 1 0,0-1 0,0 0 0,0 1 0,1-1 0,-1 0 0,0 1 0,0-1 0,1 0 0,-1 0 0,1 0 0,-1 0 0,1 1 0,-1-1 0,1 0 0,-1 0 0,1 0 0,0 0 0,0 0 0,-1 0 0,1 0 0,0 0 0,0 0 0,0 0 0,0 0 0,0 0 0,0 0 0,0 0 0,1 0 0,-1 0 0,0 0 0,0 0 0,1 0 0,-1 0 0,1 0 0,-1 0 0,1 0 0,-1 0 0,2-1 0,0-2 0,1-1 0,0 1 0,1 0 0,-1 0 0,1 0 0,-1 0 0,1 1 0,0 0 0,0-1 0,1 2 0,5-4 0,5-2 0,1 1 0,18-5 0,-18 6 0,0 0 0,16-8 0,46-24 0,-104 55 0,17-11 0,0 0 0,0 0 0,0-1 0,-1 0 0,-16 6 0,22-10 0,1 0 0,-1 0 0,1 0 0,-1 1 0,1-1 0,-1 1 0,1 0 0,0 0 0,0 0 0,0 1 0,0-1 0,1 1 0,-1-1 0,1 1 0,-1 0 0,1 0 0,0 0 0,0 0 0,0 0 0,0 1 0,-1 4 0,0 4 0,0 0 0,1 0 0,0 1 0,1-1 0,0 14 0,-5 34 0,2-33-455,0 0 0,1 47 0,3-59-6371</inkml:trace>
+</inkml:ink>
+</file>
+
+<file path=ppt/ink/ink5.xml><?xml version="1.0" encoding="utf-8"?>
+<inkml:ink xmlns:inkml="http://www.w3.org/2003/InkML">
+  <inkml:definitions>
+    <inkml:context xml:id="ctx0">
+      <inkml:inkSource xml:id="inkSrc0">
+        <inkml:traceFormat>
+          <inkml:channel name="X" type="integer" min="-2.14748E9" max="2.14748E9" units="cm"/>
+          <inkml:channel name="Y" type="integer" min="-2.14748E9" max="2.14748E9" units="cm"/>
+          <inkml:channel name="F" type="integer" max="32767" units="dev"/>
+        </inkml:traceFormat>
+        <inkml:channelProperties>
+          <inkml:channelProperty channel="X" name="resolution" value="1000" units="1/cm"/>
+          <inkml:channelProperty channel="Y" name="resolution" value="1000" units="1/cm"/>
+          <inkml:channelProperty channel="F" name="resolution" value="0" units="1/dev"/>
+        </inkml:channelProperties>
+      </inkml:inkSource>
+      <inkml:timestamp xml:id="ts0" timeString="2024-06-05T13:08:56.891"/>
+    </inkml:context>
+    <inkml:brush xml:id="br0">
+      <inkml:brushProperty name="width" value="0.05" units="cm"/>
+      <inkml:brushProperty name="height" value="0.05" units="cm"/>
+      <inkml:brushProperty name="color" value="#E71224"/>
+    </inkml:brush>
+  </inkml:definitions>
+  <inkml:trace contextRef="#ctx0" brushRef="#br0">1971 126 24575,'-116'0'0,"-341"-10"0,-26 2 0,295 10 0,-187-2 0,362 1 0,-1 0 0,1 1 0,-1 0 0,1 1 0,0 0 0,0 1 0,0 1 0,1 0 0,0 1 0,-17 10 0,-12 2 0,36-17 0,0 0 0,1 1 0,-1-1 0,1 1 0,-1 0 0,1 1 0,0-1 0,0 1 0,0 0 0,0 0 0,1 0 0,-1 0 0,1 1 0,0-1 0,-6 9 0,-8 18 0,-22 48 0,34-64 0,0 0 0,1 1 0,1-1 0,0 1 0,0 0 0,1 17 0,3 118 0,0-144 0,0 0 0,0 0 0,1 0 0,0-1 0,0 1 0,0-1 0,1 1 0,3 4 0,30 43 0,-17-26 0,11 17 0,1-2 0,2-1 0,2-2 0,47 42 0,-27-37 0,2-1 0,2-3 0,106 54 0,-108-69 0,0-3 0,2-2 0,114 23 0,-102-32 0,81 3 0,9 0 0,261 21 0,-259-26 0,-13 1 0,422 16 0,-385-18 0,-11 0 0,-91-7 0,28 0 0,118-13 0,-176 2 0,71-21 0,-40 9 0,138-39 0,-71 18 0,-49-1 0,-41 16 0,3-2 0,91-57 0,-149 81 0,-1 1 0,0-1 0,0-1 0,0 1 0,-1-1 0,0 0 0,-1-1 0,1 0 0,-1 1 0,-1-2 0,0 1 0,0 0 0,0-1 0,4-17 0,0-10 0,0 0 0,2-51 0,-9 82 0,3-43 0,-2 1 0,-6-65 0,2 105 0,1 0 0,-1 0 0,0 1 0,-1-1 0,0 0 0,0 1 0,-4-7 0,-9-21 0,10 21 0,0 0 0,-1 0 0,0 1 0,-1 0 0,-1 0 0,0 0 0,0 1 0,-14-12 0,-7-4 0,-56-37 0,66 52 0,-1 1 0,-1 1 0,0 1 0,0 1 0,-34-8 0,-23-9 0,28 8 0,0 3 0,-65-11 0,-109-1 0,40 5 0,-41-2 0,-52-10 0,122 11 0,54 15 0,-125 7 0,95 2 0,-255-2 0,373 1 0,0 0 0,0 2 0,1 0 0,-1 0 0,1 1 0,0 1 0,-25 12 0,-15 14 295,26-15-1125,-31 14 0,49-26-5996</inkml:trace>
+</inkml:ink>
+</file>
+
+<file path=ppt/ink/ink6.xml><?xml version="1.0" encoding="utf-8"?>
+<inkml:ink xmlns:inkml="http://www.w3.org/2003/InkML">
+  <inkml:definitions>
+    <inkml:context xml:id="ctx0">
+      <inkml:inkSource xml:id="inkSrc0">
+        <inkml:traceFormat>
+          <inkml:channel name="X" type="integer" min="-2.14748E9" max="2.14748E9" units="cm"/>
+          <inkml:channel name="Y" type="integer" min="-2.14748E9" max="2.14748E9" units="cm"/>
+          <inkml:channel name="F" type="integer" max="32767" units="dev"/>
+        </inkml:traceFormat>
+        <inkml:channelProperties>
+          <inkml:channelProperty channel="X" name="resolution" value="1000" units="1/cm"/>
+          <inkml:channelProperty channel="Y" name="resolution" value="1000" units="1/cm"/>
+          <inkml:channelProperty channel="F" name="resolution" value="0" units="1/dev"/>
+        </inkml:channelProperties>
+      </inkml:inkSource>
+      <inkml:timestamp xml:id="ts0" timeString="2024-06-05T13:09:05.124"/>
+    </inkml:context>
+    <inkml:brush xml:id="br0">
+      <inkml:brushProperty name="width" value="0.05" units="cm"/>
+      <inkml:brushProperty name="height" value="0.05" units="cm"/>
+      <inkml:brushProperty name="color" value="#E71224"/>
+    </inkml:brush>
+  </inkml:definitions>
+  <inkml:trace contextRef="#ctx0" brushRef="#br0">0 136 24575,'977'0'0,"-952"-2"0,31-4 0,-32 2 0,35 0 0,-4 4 0,-55 0 0,0 0 0,1 0 0,-1 0 0,0 0 0,0 0 0,1 0 0,-1 0 0,0 0 0,0 0 0,1 0 0,-1 0 0,0 0 0,0-1 0,1 1 0,-1 0 0,0 0 0,0 0 0,0 0 0,1 0 0,-1-1 0,0 1 0,0 0 0,0 0 0,0 0 0,1-1 0,-1 1 0,0 0 0,0 0 0,0-1 0,0 1 0,0 0 0,0 0 0,0-1 0,0 1 0,0 0 0,0 0 0,0-1 0,0 1 0,0 0 0,0 0 0,0-1 0,0 1 0,0 0 0,0-1 0,0 1 0,0 0 0,0 0 0,0 0 0,0-1 0,0 1 0,-1 0 0,1 0 0,0-1 0,0 1 0,0 0 0,0 0 0,-1 0 0,1 0 0,0-1 0,0 1 0,0 0 0,-1 0 0,1 0 0,0 0 0,0 0 0,-1-1 0,-19-14 0,16 12 0,-13-13 0,12 11 0,-1 0 0,1 1 0,0 0 0,-1 0 0,0 0 0,-8-4 0,9 6 0,-1 0 0,1-1 0,-1 1 0,0-1 0,1-1 0,0 1 0,0-1 0,0 0 0,-8-8 0,49 27 0,-21-8 0,-13-7 0,0 1 0,0-1 0,0 1 0,0 0 0,0 0 0,0 0 0,0 0 0,0 0 0,0 1 0,0-1 0,0 0 0,-1 1 0,1 0 0,-1-1 0,1 1 0,-1 0 0,1 0 0,-1 0 0,0 0 0,0 0 0,0 0 0,0 0 0,0 0 0,-1 0 0,1 0 0,-1 0 0,1 1 0,-1-1 0,0 3 0,1-1 14,-1-1-1,0 0 0,-1 1 0,1-1 1,0 0-1,-1 0 0,0 1 0,0-1 1,0 0-1,0 0 0,0 0 0,0 0 1,-1 0-1,0 0 0,1-1 0,-1 1 1,0 0-1,0-1 0,-1 1 0,1-1 1,-3 2-1,-5 3-77,0 0-1,0-1 1,-1-1 0,-17 8 0,-15 7-1272,35-15-5490</inkml:trace>
+</inkml:ink>
+</file>
+
+<file path=ppt/ink/ink7.xml><?xml version="1.0" encoding="utf-8"?>
+<inkml:ink xmlns:inkml="http://www.w3.org/2003/InkML">
+  <inkml:definitions>
+    <inkml:context xml:id="ctx0">
+      <inkml:inkSource xml:id="inkSrc0">
+        <inkml:traceFormat>
+          <inkml:channel name="X" type="integer" min="-2.14748E9" max="2.14748E9" units="cm"/>
+          <inkml:channel name="Y" type="integer" min="-2.14748E9" max="2.14748E9" units="cm"/>
+          <inkml:channel name="F" type="integer" max="32767" units="dev"/>
+        </inkml:traceFormat>
+        <inkml:channelProperties>
+          <inkml:channelProperty channel="X" name="resolution" value="1000" units="1/cm"/>
+          <inkml:channelProperty channel="Y" name="resolution" value="1000" units="1/cm"/>
+          <inkml:channelProperty channel="F" name="resolution" value="0" units="1/dev"/>
+        </inkml:channelProperties>
+      </inkml:inkSource>
+      <inkml:timestamp xml:id="ts0" timeString="2024-06-05T13:09:09.501"/>
+    </inkml:context>
+    <inkml:brush xml:id="br0">
+      <inkml:brushProperty name="width" value="0.05" units="cm"/>
+      <inkml:brushProperty name="height" value="0.05" units="cm"/>
+      <inkml:brushProperty name="color" value="#E71224"/>
+    </inkml:brush>
+  </inkml:definitions>
+  <inkml:trace contextRef="#ctx0" brushRef="#br0">1 130 24575,'755'0'0,"-744"1"0,1 0 0,20 5 0,20 2 0,195-8 0,-246 0 0,1 0 0,-1 1 0,0-1 0,1 0 0,-1-1 0,0 1 0,0 0 0,1 0 0,-1-1 0,0 1 0,1 0 0,-1-1 0,0 1 0,0-1 0,0 0 0,0 1 0,0-1 0,1 0 0,-1 0 0,0 1 0,1-3 0,-2 2 0,0 0 0,0 0 0,1 0 0,-1-1 0,0 1 0,0 0 0,0 0 0,-1 0 0,1-1 0,0 1 0,0 0 0,-1 0 0,1 0 0,0 0 0,-1 0 0,0 0 0,1 0 0,-1 0 0,1 0 0,-1 0 0,0 0 0,0 0 0,1 0 0,-3-1 0,-3-4 0,0 0 0,0 1 0,-10-7 0,-17-15 0,20 10 0,11 13 0,-1 1 0,0-1 0,0 0 0,0 1 0,0 0 0,0 0 0,-1 0 0,-5-4 0,9 8 0,0 1 0,0-1 0,0 1 0,1-1 0,-1 0 0,1 1 0,-1-1 0,1 0 0,-1 1 0,1-1 0,0 0 0,0 2 0,17 24 0,-14-21 0,1 0 0,-1 0 0,-1 1 0,1-1 0,-1 1 0,4 12 0,-5-12 0,1 0 0,0-1 0,0 1 0,0-1 0,1 0 0,0 1 0,0-2 0,1 1 0,0 0 0,10 9 0,-14-15 0,0 1 0,0 0 0,-1 0 0,1-1 0,0 1 0,-1 0 0,1 0 0,-1-1 0,1 1 0,-1 0 0,1 0 0,-1 0 0,0 0 0,1 0 0,-1 0 0,0 0 0,0 0 0,0 0 0,0 0 0,0 0 0,0 0 0,0 0 0,0 1 0,-1 0 0,1 0 0,-1-1 0,0 1 0,0-1 0,0 0 0,0 1 0,0-1 0,0 0 0,0 1 0,0-1 0,0 0 0,-3 2 0,-6 3 0,1-1 0,-1 0 0,-16 6 0,17-8 0,-14 7 169,7-4-680,1 0-1,-24 15 1,28-14-6315</inkml:trace>
 </inkml:ink>
 </file>
 
@@ -6618,62 +6786,32 @@
       </p:sp>
       <p:pic>
         <p:nvPicPr>
-          <p:cNvPr id="20484" name="Picture 2">
+          <p:cNvPr id="3" name="Picture 2">
             <a:extLst>
               <a:ext uri="{FF2B5EF4-FFF2-40B4-BE49-F238E27FC236}">
-                <a16:creationId xmlns:a16="http://schemas.microsoft.com/office/drawing/2014/main" id="{45B832C1-2E9C-EC10-322B-9A8B68EB1F1F}"/>
+                <a16:creationId xmlns:a16="http://schemas.microsoft.com/office/drawing/2014/main" id="{BE75A4E5-6FD0-D95B-D9FF-F4BE86D97673}"/>
               </a:ext>
             </a:extLst>
           </p:cNvPr>
           <p:cNvPicPr>
-            <a:picLocks noChangeAspect="1" noChangeArrowheads="1"/>
+            <a:picLocks noChangeAspect="1"/>
           </p:cNvPicPr>
           <p:nvPr/>
         </p:nvPicPr>
         <p:blipFill>
-          <a:blip r:embed="rId2">
-            <a:extLst>
-              <a:ext uri="{28A0092B-C50C-407E-A947-70E740481C1C}">
-                <a14:useLocalDpi xmlns:a14="http://schemas.microsoft.com/office/drawing/2010/main" val="0"/>
-              </a:ext>
-            </a:extLst>
-          </a:blip>
-          <a:srcRect/>
+          <a:blip r:embed="rId2"/>
           <a:stretch>
             <a:fillRect/>
           </a:stretch>
         </p:blipFill>
-        <p:spPr bwMode="auto">
+        <p:spPr>
           <a:xfrm>
-            <a:off x="4114800" y="2590800"/>
-            <a:ext cx="4495800" cy="3238500"/>
+            <a:off x="3886200" y="2590800"/>
+            <a:ext cx="4724400" cy="3034114"/>
           </a:xfrm>
           <a:prstGeom prst="rect">
             <a:avLst/>
           </a:prstGeom>
-          <a:noFill/>
-          <a:ln>
-            <a:noFill/>
-          </a:ln>
-          <a:extLst>
-            <a:ext uri="{909E8E84-426E-40DD-AFC4-6F175D3DCCD1}">
-              <a14:hiddenFill xmlns:a14="http://schemas.microsoft.com/office/drawing/2010/main">
-                <a:solidFill>
-                  <a:srgbClr val="FFFFFF"/>
-                </a:solidFill>
-              </a14:hiddenFill>
-            </a:ext>
-            <a:ext uri="{91240B29-F687-4F45-9708-019B960494DF}">
-              <a14:hiddenLine xmlns:a14="http://schemas.microsoft.com/office/drawing/2010/main" w="9525">
-                <a:solidFill>
-                  <a:srgbClr val="000000"/>
-                </a:solidFill>
-                <a:miter lim="800000"/>
-                <a:headEnd/>
-                <a:tailEnd/>
-              </a14:hiddenLine>
-            </a:ext>
-          </a:extLst>
         </p:spPr>
       </p:pic>
     </p:spTree>
@@ -6732,60 +6870,15 @@
                                   </p:childTnLst>
                                 </p:cTn>
                               </p:par>
-                            </p:childTnLst>
-                          </p:cTn>
-                        </p:par>
-                      </p:childTnLst>
-                    </p:cTn>
-                  </p:par>
-                  <p:par>
-                    <p:cTn id="7" fill="hold" nodeType="clickPar">
-                      <p:stCondLst>
-                        <p:cond delay="indefinite"/>
-                      </p:stCondLst>
-                      <p:childTnLst>
-                        <p:par>
-                          <p:cTn id="8" fill="hold" nodeType="withGroup">
-                            <p:stCondLst>
-                              <p:cond delay="0"/>
-                            </p:stCondLst>
-                            <p:childTnLst>
                               <p:par>
-                                <p:cTn id="9" presetID="1" presetClass="entr" presetSubtype="0" fill="hold" nodeType="clickEffect">
+                                <p:cTn id="7" presetID="1" presetClass="entr" presetSubtype="0" fill="hold" nodeType="withEffect">
                                   <p:stCondLst>
                                     <p:cond delay="0"/>
                                   </p:stCondLst>
                                   <p:childTnLst>
                                     <p:set>
                                       <p:cBhvr>
-                                        <p:cTn id="10" dur="1" fill="hold">
-                                          <p:stCondLst>
-                                            <p:cond delay="0"/>
-                                          </p:stCondLst>
-                                        </p:cTn>
-                                        <p:tgtEl>
-                                          <p:spTgt spid="20484"/>
-                                        </p:tgtEl>
-                                        <p:attrNameLst>
-                                          <p:attrName>style.visibility</p:attrName>
-                                        </p:attrNameLst>
-                                      </p:cBhvr>
-                                      <p:to>
-                                        <p:strVal val="visible"/>
-                                      </p:to>
-                                    </p:set>
-                                  </p:childTnLst>
-                                </p:cTn>
-                              </p:par>
-                              <p:par>
-                                <p:cTn id="11" presetID="1" presetClass="entr" presetSubtype="0" fill="hold" nodeType="withEffect">
-                                  <p:stCondLst>
-                                    <p:cond delay="0"/>
-                                  </p:stCondLst>
-                                  <p:childTnLst>
-                                    <p:set>
-                                      <p:cBhvr>
-                                        <p:cTn id="12" dur="1" fill="hold">
+                                        <p:cTn id="8" dur="1" fill="hold">
                                           <p:stCondLst>
                                             <p:cond delay="0"/>
                                           </p:stCondLst>
@@ -6899,8 +6992,17 @@
               <a:rPr lang="en-IE" altLang="en-US" sz="2000" dirty="0">
                 <a:ea typeface="ＭＳ Ｐゴシック" panose="020B0600070205080204" pitchFamily="34" charset="-128"/>
               </a:rPr>
-              <a:t>:</a:t>
-            </a:r>
+              <a:t>: </a:t>
+            </a:r>
+            <a:r>
+              <a:rPr lang="en-IE" altLang="en-US" sz="2000" dirty="0" err="1">
+                <a:ea typeface="ＭＳ Ｐゴシック" panose="020B0600070205080204" pitchFamily="34" charset="-128"/>
+              </a:rPr>
+              <a:t>useBook.tsx</a:t>
+            </a:r>
+            <a:endParaRPr lang="en-IE" altLang="en-US" sz="2000" dirty="0">
+              <a:ea typeface="ＭＳ Ｐゴシック" panose="020B0600070205080204" pitchFamily="34" charset="-128"/>
+            </a:endParaRPr>
           </a:p>
           <a:p>
             <a:pPr>
@@ -6963,23 +7065,19 @@
             <a:pPr>
               <a:defRPr/>
             </a:pPr>
+            <a:endParaRPr lang="en-IE" altLang="en-US" sz="2000" dirty="0">
+              <a:ea typeface="ＭＳ Ｐゴシック" panose="020B0600070205080204" pitchFamily="34" charset="-128"/>
+            </a:endParaRPr>
+          </a:p>
+          <a:p>
+            <a:pPr>
+              <a:defRPr/>
+            </a:pPr>
             <a:r>
               <a:rPr lang="en-IE" altLang="en-US" sz="2000" dirty="0">
                 <a:ea typeface="ＭＳ Ｐゴシック" panose="020B0600070205080204" pitchFamily="34" charset="-128"/>
               </a:rPr>
-              <a:t>Custom Hook is an ordinary function </a:t>
-            </a:r>
-            <a:r>
-              <a:rPr lang="en-IE" altLang="en-US" sz="2000">
-                <a:ea typeface="ＭＳ Ｐゴシック" panose="020B0600070205080204" pitchFamily="34" charset="-128"/>
-              </a:rPr>
-              <a:t>BUT should only </a:t>
-            </a:r>
-            <a:r>
-              <a:rPr lang="en-IE" altLang="en-US" sz="2000" dirty="0">
-                <a:ea typeface="ＭＳ Ｐゴシック" panose="020B0600070205080204" pitchFamily="34" charset="-128"/>
-              </a:rPr>
-              <a:t>be called from a React component function.</a:t>
+              <a:t>Custom Hook is an ordinary function BUT should only be called from a React component function.</a:t>
             </a:r>
           </a:p>
           <a:p>
@@ -7254,122 +7352,62 @@
       </p:sp>
       <p:pic>
         <p:nvPicPr>
-          <p:cNvPr id="21508" name="Picture 3">
+          <p:cNvPr id="3" name="Picture 2">
             <a:extLst>
               <a:ext uri="{FF2B5EF4-FFF2-40B4-BE49-F238E27FC236}">
-                <a16:creationId xmlns:a16="http://schemas.microsoft.com/office/drawing/2014/main" id="{A1CD73D5-A782-CE1E-D0A3-92CC88F16B19}"/>
+                <a16:creationId xmlns:a16="http://schemas.microsoft.com/office/drawing/2014/main" id="{FA0EB61B-F35D-02B7-FB3A-A032DCA070D8}"/>
               </a:ext>
             </a:extLst>
           </p:cNvPr>
           <p:cNvPicPr>
-            <a:picLocks noChangeAspect="1" noChangeArrowheads="1"/>
+            <a:picLocks noChangeAspect="1"/>
           </p:cNvPicPr>
           <p:nvPr/>
         </p:nvPicPr>
         <p:blipFill>
-          <a:blip r:embed="rId2">
-            <a:extLst>
-              <a:ext uri="{28A0092B-C50C-407E-A947-70E740481C1C}">
-                <a14:useLocalDpi xmlns:a14="http://schemas.microsoft.com/office/drawing/2010/main" val="0"/>
-              </a:ext>
-            </a:extLst>
-          </a:blip>
-          <a:srcRect/>
+          <a:blip r:embed="rId2"/>
           <a:stretch>
             <a:fillRect/>
           </a:stretch>
         </p:blipFill>
-        <p:spPr bwMode="auto">
+        <p:spPr>
           <a:xfrm>
-            <a:off x="2146300" y="1828800"/>
-            <a:ext cx="4191000" cy="2590800"/>
+            <a:off x="1600200" y="1821673"/>
+            <a:ext cx="3765360" cy="2971800"/>
           </a:xfrm>
           <a:prstGeom prst="rect">
             <a:avLst/>
           </a:prstGeom>
-          <a:noFill/>
-          <a:ln>
-            <a:noFill/>
-          </a:ln>
-          <a:extLst>
-            <a:ext uri="{909E8E84-426E-40DD-AFC4-6F175D3DCCD1}">
-              <a14:hiddenFill xmlns:a14="http://schemas.microsoft.com/office/drawing/2010/main">
-                <a:solidFill>
-                  <a:srgbClr val="FFFFFF"/>
-                </a:solidFill>
-              </a14:hiddenFill>
-            </a:ext>
-            <a:ext uri="{91240B29-F687-4F45-9708-019B960494DF}">
-              <a14:hiddenLine xmlns:a14="http://schemas.microsoft.com/office/drawing/2010/main" w="9525">
-                <a:solidFill>
-                  <a:srgbClr val="000000"/>
-                </a:solidFill>
-                <a:miter lim="800000"/>
-                <a:headEnd/>
-                <a:tailEnd/>
-              </a14:hiddenLine>
-            </a:ext>
-          </a:extLst>
         </p:spPr>
       </p:pic>
       <p:pic>
         <p:nvPicPr>
-          <p:cNvPr id="21509" name="Picture 5">
+          <p:cNvPr id="5" name="Picture 4">
             <a:extLst>
               <a:ext uri="{FF2B5EF4-FFF2-40B4-BE49-F238E27FC236}">
-                <a16:creationId xmlns:a16="http://schemas.microsoft.com/office/drawing/2014/main" id="{403F1FA4-78E4-F3D0-9DA5-78F74CCC51EB}"/>
+                <a16:creationId xmlns:a16="http://schemas.microsoft.com/office/drawing/2014/main" id="{5E9760AD-33CA-7A74-69A2-BCC2E6A00ED5}"/>
               </a:ext>
             </a:extLst>
           </p:cNvPr>
           <p:cNvPicPr>
-            <a:picLocks noChangeAspect="1" noChangeArrowheads="1"/>
+            <a:picLocks noChangeAspect="1"/>
           </p:cNvPicPr>
           <p:nvPr/>
         </p:nvPicPr>
         <p:blipFill>
-          <a:blip r:embed="rId3">
-            <a:extLst>
-              <a:ext uri="{28A0092B-C50C-407E-A947-70E740481C1C}">
-                <a14:useLocalDpi xmlns:a14="http://schemas.microsoft.com/office/drawing/2010/main" val="0"/>
-              </a:ext>
-            </a:extLst>
-          </a:blip>
-          <a:srcRect/>
+          <a:blip r:embed="rId3"/>
           <a:stretch>
             <a:fillRect/>
           </a:stretch>
         </p:blipFill>
-        <p:spPr bwMode="auto">
+        <p:spPr>
           <a:xfrm>
-            <a:off x="6448425" y="2214563"/>
-            <a:ext cx="4121150" cy="1625600"/>
+            <a:off x="5711475" y="1821673"/>
+            <a:ext cx="6165377" cy="2971800"/>
           </a:xfrm>
           <a:prstGeom prst="rect">
             <a:avLst/>
           </a:prstGeom>
-          <a:noFill/>
-          <a:ln>
-            <a:noFill/>
-          </a:ln>
-          <a:extLst>
-            <a:ext uri="{909E8E84-426E-40DD-AFC4-6F175D3DCCD1}">
-              <a14:hiddenFill xmlns:a14="http://schemas.microsoft.com/office/drawing/2010/main">
-                <a:solidFill>
-                  <a:srgbClr val="FFFFFF"/>
-                </a:solidFill>
-              </a14:hiddenFill>
-            </a:ext>
-            <a:ext uri="{91240B29-F687-4F45-9708-019B960494DF}">
-              <a14:hiddenLine xmlns:a14="http://schemas.microsoft.com/office/drawing/2010/main" w="9525">
-                <a:solidFill>
-                  <a:srgbClr val="000000"/>
-                </a:solidFill>
-                <a:miter lim="800000"/>
-                <a:headEnd/>
-                <a:tailEnd/>
-              </a14:hiddenLine>
-            </a:ext>
-          </a:extLst>
         </p:spPr>
       </p:pic>
     </p:spTree>
@@ -7411,7 +7449,11 @@
                                           </p:stCondLst>
                                         </p:cTn>
                                         <p:tgtEl>
-                                          <p:spTgt spid="21508"/>
+                                          <p:spTgt spid="21505">
+                                            <p:txEl>
+                                              <p:pRg st="9" end="9"/>
+                                            </p:txEl>
+                                          </p:spTgt>
                                         </p:tgtEl>
                                         <p:attrNameLst>
                                           <p:attrName>style.visibility</p:attrName>
@@ -7456,7 +7498,11 @@
                                           </p:stCondLst>
                                         </p:cTn>
                                         <p:tgtEl>
-                                          <p:spTgt spid="21509"/>
+                                          <p:spTgt spid="21505">
+                                            <p:txEl>
+                                              <p:pRg st="10" end="10"/>
+                                            </p:txEl>
+                                          </p:spTgt>
                                         </p:tgtEl>
                                         <p:attrNameLst>
                                           <p:attrName>style.visibility</p:attrName>
@@ -7503,105 +7549,7 @@
                                         <p:tgtEl>
                                           <p:spTgt spid="21505">
                                             <p:txEl>
-                                              <p:pRg st="8" end="8"/>
-                                            </p:txEl>
-                                          </p:spTgt>
-                                        </p:tgtEl>
-                                        <p:attrNameLst>
-                                          <p:attrName>style.visibility</p:attrName>
-                                        </p:attrNameLst>
-                                      </p:cBhvr>
-                                      <p:to>
-                                        <p:strVal val="visible"/>
-                                      </p:to>
-                                    </p:set>
-                                  </p:childTnLst>
-                                </p:cTn>
-                              </p:par>
-                            </p:childTnLst>
-                          </p:cTn>
-                        </p:par>
-                      </p:childTnLst>
-                    </p:cTn>
-                  </p:par>
-                  <p:par>
-                    <p:cTn id="15" fill="hold" nodeType="clickPar">
-                      <p:stCondLst>
-                        <p:cond delay="indefinite"/>
-                      </p:stCondLst>
-                      <p:childTnLst>
-                        <p:par>
-                          <p:cTn id="16" fill="hold" nodeType="withGroup">
-                            <p:stCondLst>
-                              <p:cond delay="0"/>
-                            </p:stCondLst>
-                            <p:childTnLst>
-                              <p:par>
-                                <p:cTn id="17" presetID="1" presetClass="entr" presetSubtype="0" fill="hold" nodeType="clickEffect">
-                                  <p:stCondLst>
-                                    <p:cond delay="0"/>
-                                  </p:stCondLst>
-                                  <p:childTnLst>
-                                    <p:set>
-                                      <p:cBhvr>
-                                        <p:cTn id="18" dur="1" fill="hold">
-                                          <p:stCondLst>
-                                            <p:cond delay="0"/>
-                                          </p:stCondLst>
-                                        </p:cTn>
-                                        <p:tgtEl>
-                                          <p:spTgt spid="21505">
-                                            <p:txEl>
-                                              <p:pRg st="9" end="9"/>
-                                            </p:txEl>
-                                          </p:spTgt>
-                                        </p:tgtEl>
-                                        <p:attrNameLst>
-                                          <p:attrName>style.visibility</p:attrName>
-                                        </p:attrNameLst>
-                                      </p:cBhvr>
-                                      <p:to>
-                                        <p:strVal val="visible"/>
-                                      </p:to>
-                                    </p:set>
-                                  </p:childTnLst>
-                                </p:cTn>
-                              </p:par>
-                            </p:childTnLst>
-                          </p:cTn>
-                        </p:par>
-                      </p:childTnLst>
-                    </p:cTn>
-                  </p:par>
-                  <p:par>
-                    <p:cTn id="19" fill="hold" nodeType="clickPar">
-                      <p:stCondLst>
-                        <p:cond delay="indefinite"/>
-                      </p:stCondLst>
-                      <p:childTnLst>
-                        <p:par>
-                          <p:cTn id="20" fill="hold" nodeType="withGroup">
-                            <p:stCondLst>
-                              <p:cond delay="0"/>
-                            </p:stCondLst>
-                            <p:childTnLst>
-                              <p:par>
-                                <p:cTn id="21" presetID="1" presetClass="entr" presetSubtype="0" fill="hold" nodeType="clickEffect">
-                                  <p:stCondLst>
-                                    <p:cond delay="0"/>
-                                  </p:stCondLst>
-                                  <p:childTnLst>
-                                    <p:set>
-                                      <p:cBhvr>
-                                        <p:cTn id="22" dur="1" fill="hold">
-                                          <p:stCondLst>
-                                            <p:cond delay="0"/>
-                                          </p:stCondLst>
-                                        </p:cTn>
-                                        <p:tgtEl>
-                                          <p:spTgt spid="21505">
-                                            <p:txEl>
-                                              <p:pRg st="10" end="10"/>
+                                              <p:pRg st="11" end="11"/>
                                             </p:txEl>
                                           </p:spTgt>
                                         </p:tgtEl>
@@ -9539,22 +9487,44 @@
             </a:pPr>
             <a:r>
               <a:rPr lang="en-IE" sz="2000" dirty="0"/>
-              <a:t>The container determines what </a:t>
-            </a:r>
-            <a:r>
-              <a:rPr lang="en-IE" sz="2000" b="0" dirty="0"/>
-              <a:t>Picture</a:t>
+              <a:t>See: </a:t>
+            </a:r>
+            <a:r>
+              <a:rPr lang="en-IE" sz="2000" dirty="0" err="1"/>
+              <a:t>sampleChildren.tsx</a:t>
             </a:r>
             <a:r>
               <a:rPr lang="en-IE" sz="2000" dirty="0"/>
-              <a:t> renders,</a:t>
-            </a:r>
+              <a:t> in </a:t>
+            </a:r>
+            <a:r>
+              <a:rPr lang="en-IE" sz="2000" dirty="0" err="1"/>
+              <a:t>routingSamples</a:t>
+            </a:r>
+            <a:endParaRPr lang="en-IE" sz="2000" dirty="0"/>
           </a:p>
           <a:p>
             <a:pPr>
               <a:defRPr/>
             </a:pPr>
             <a:r>
+              <a:rPr lang="en-IE" sz="2000" dirty="0"/>
+              <a:t>The container determines what </a:t>
+            </a:r>
+            <a:r>
+              <a:rPr lang="en-IE" sz="2000" b="0" dirty="0" err="1"/>
+              <a:t>DemoComponent</a:t>
+            </a:r>
+            <a:r>
+              <a:rPr lang="en-IE" sz="2000" dirty="0"/>
+              <a:t> renders,</a:t>
+            </a:r>
+          </a:p>
+          <a:p>
+            <a:pPr>
+              <a:defRPr/>
+            </a:pPr>
+            <a:r>
               <a:rPr lang="en-IE" altLang="en-US" sz="2000" dirty="0">
                 <a:ea typeface="ＭＳ Ｐゴシック" panose="020B0600070205080204" pitchFamily="34" charset="-128"/>
               </a:rPr>
@@ -9573,16 +9543,22 @@
               <a:t> the </a:t>
             </a:r>
             <a:r>
-              <a:rPr lang="en-IE" altLang="en-US" sz="2000" b="0" dirty="0">
+              <a:rPr lang="en-IE" sz="2000" b="0" dirty="0"/>
+              <a:t> </a:t>
+            </a:r>
+            <a:r>
+              <a:rPr lang="en-IE" sz="2000" b="0" dirty="0" err="1"/>
+              <a:t>DemoComponent</a:t>
+            </a:r>
+            <a:r>
+              <a:rPr lang="en-IE" sz="2000" b="0" dirty="0"/>
+              <a:t> </a:t>
+            </a:r>
+            <a:r>
+              <a:rPr lang="en-IE" altLang="en-US" sz="2000" dirty="0">
                 <a:ea typeface="ＭＳ Ｐゴシック" panose="020B0600070205080204" pitchFamily="34" charset="-128"/>
               </a:rPr>
-              <a:t>Picture</a:t>
-            </a:r>
-            <a:r>
-              <a:rPr lang="en-IE" altLang="en-US" sz="2000" dirty="0">
-                <a:ea typeface="ＭＳ Ｐゴシック" panose="020B0600070205080204" pitchFamily="34" charset="-128"/>
-              </a:rPr>
-              <a:t> component from its content and makes it </a:t>
+              <a:t> from its content and makes it </a:t>
             </a:r>
             <a:r>
               <a:rPr lang="en-IE" altLang="en-US" sz="2000" u="sng" dirty="0">
@@ -9832,69 +9808,9 @@
           </a:p>
         </p:txBody>
       </p:sp>
-      <p:pic>
-        <p:nvPicPr>
-          <p:cNvPr id="15" name="Picture 14">
-            <a:extLst>
-              <a:ext uri="{FF2B5EF4-FFF2-40B4-BE49-F238E27FC236}">
-                <a16:creationId xmlns:a16="http://schemas.microsoft.com/office/drawing/2014/main" id="{B1521407-3655-F8DC-08AD-13618C68552F}"/>
-              </a:ext>
-            </a:extLst>
-          </p:cNvPr>
-          <p:cNvPicPr>
-            <a:picLocks noChangeAspect="1" noChangeArrowheads="1"/>
-          </p:cNvPicPr>
-          <p:nvPr/>
-        </p:nvPicPr>
-        <p:blipFill>
-          <a:blip r:embed="rId2">
-            <a:extLst>
-              <a:ext uri="{28A0092B-C50C-407E-A947-70E740481C1C}">
-                <a14:useLocalDpi xmlns:a14="http://schemas.microsoft.com/office/drawing/2010/main" val="0"/>
-              </a:ext>
-            </a:extLst>
-          </a:blip>
-          <a:srcRect/>
-          <a:stretch>
-            <a:fillRect/>
-          </a:stretch>
-        </p:blipFill>
-        <p:spPr bwMode="auto">
-          <a:xfrm>
-            <a:off x="2438400" y="2378075"/>
-            <a:ext cx="3035300" cy="2355850"/>
-          </a:xfrm>
-          <a:prstGeom prst="rect">
-            <a:avLst/>
-          </a:prstGeom>
-          <a:noFill/>
-          <a:ln>
-            <a:noFill/>
-          </a:ln>
-          <a:extLst>
-            <a:ext uri="{909E8E84-426E-40DD-AFC4-6F175D3DCCD1}">
-              <a14:hiddenFill xmlns:a14="http://schemas.microsoft.com/office/drawing/2010/main">
-                <a:solidFill>
-                  <a:srgbClr val="FFFFFF"/>
-                </a:solidFill>
-              </a14:hiddenFill>
-            </a:ext>
-            <a:ext uri="{91240B29-F687-4F45-9708-019B960494DF}">
-              <a14:hiddenLine xmlns:a14="http://schemas.microsoft.com/office/drawing/2010/main" w="9525">
-                <a:solidFill>
-                  <a:srgbClr val="000000"/>
-                </a:solidFill>
-                <a:miter lim="800000"/>
-                <a:headEnd/>
-                <a:tailEnd/>
-              </a14:hiddenLine>
-            </a:ext>
-          </a:extLst>
-        </p:spPr>
-      </p:pic>
       <mc:AlternateContent xmlns:mc="http://schemas.openxmlformats.org/markup-compatibility/2006" xmlns:p14="http://schemas.microsoft.com/office/powerpoint/2010/main">
         <mc:Choice Requires="p14">
-          <p:contentPart p14:bwMode="auto" r:id="rId3">
+          <p:contentPart p14:bwMode="auto" r:id="rId2">
             <p14:nvContentPartPr>
               <p14:cNvPr id="2" name="Ink 1">
                 <a:extLst>
@@ -9945,64 +9861,289 @@
       </mc:AlternateContent>
       <p:pic>
         <p:nvPicPr>
-          <p:cNvPr id="6" name="Picture 5">
+          <p:cNvPr id="10" name="Picture 9">
             <a:extLst>
               <a:ext uri="{FF2B5EF4-FFF2-40B4-BE49-F238E27FC236}">
-                <a16:creationId xmlns:a16="http://schemas.microsoft.com/office/drawing/2014/main" id="{BD0437BF-46B7-621B-6556-DF64F270D2BC}"/>
+                <a16:creationId xmlns:a16="http://schemas.microsoft.com/office/drawing/2014/main" id="{64DEBC80-F270-8F64-C85A-E352F833A3FF}"/>
               </a:ext>
             </a:extLst>
           </p:cNvPr>
           <p:cNvPicPr>
-            <a:picLocks noChangeAspect="1" noChangeArrowheads="1"/>
+            <a:picLocks noChangeAspect="1"/>
           </p:cNvPicPr>
           <p:nvPr/>
         </p:nvPicPr>
         <p:blipFill>
-          <a:blip r:embed="rId5">
-            <a:extLst>
-              <a:ext uri="{28A0092B-C50C-407E-A947-70E740481C1C}">
-                <a14:useLocalDpi xmlns:a14="http://schemas.microsoft.com/office/drawing/2010/main" val="0"/>
-              </a:ext>
-            </a:extLst>
-          </a:blip>
-          <a:srcRect/>
+          <a:blip r:embed="rId5"/>
           <a:stretch>
             <a:fillRect/>
           </a:stretch>
         </p:blipFill>
-        <p:spPr bwMode="auto">
+        <p:spPr>
           <a:xfrm>
-            <a:off x="5648326" y="2154238"/>
-            <a:ext cx="3724275" cy="2570162"/>
+            <a:off x="784019" y="2686012"/>
+            <a:ext cx="3892750" cy="1485976"/>
+          </a:xfrm>
+          <a:prstGeom prst="rect">
+            <a:avLst/>
+          </a:prstGeom>
+        </p:spPr>
+      </p:pic>
+      <p:pic>
+        <p:nvPicPr>
+          <p:cNvPr id="12" name="Picture 11">
+            <a:extLst>
+              <a:ext uri="{FF2B5EF4-FFF2-40B4-BE49-F238E27FC236}">
+                <a16:creationId xmlns:a16="http://schemas.microsoft.com/office/drawing/2014/main" id="{0B4CAEB6-4EC7-065C-082D-A4A589C85F69}"/>
+              </a:ext>
+            </a:extLst>
+          </p:cNvPr>
+          <p:cNvPicPr>
+            <a:picLocks noChangeAspect="1"/>
+          </p:cNvPicPr>
+          <p:nvPr/>
+        </p:nvPicPr>
+        <p:blipFill>
+          <a:blip r:embed="rId6"/>
+          <a:stretch>
+            <a:fillRect/>
+          </a:stretch>
+        </p:blipFill>
+        <p:spPr>
+          <a:xfrm>
+            <a:off x="5410200" y="2568531"/>
+            <a:ext cx="6369377" cy="1720938"/>
+          </a:xfrm>
+          <a:prstGeom prst="rect">
+            <a:avLst/>
+          </a:prstGeom>
+        </p:spPr>
+      </p:pic>
+      <p:sp>
+        <p:nvSpPr>
+          <p:cNvPr id="13" name="TextBox 12">
+            <a:extLst>
+              <a:ext uri="{FF2B5EF4-FFF2-40B4-BE49-F238E27FC236}">
+                <a16:creationId xmlns:a16="http://schemas.microsoft.com/office/drawing/2014/main" id="{E264D2CF-E56A-5876-457C-5B238CA70792}"/>
+              </a:ext>
+            </a:extLst>
+          </p:cNvPr>
+          <p:cNvSpPr txBox="1"/>
+          <p:nvPr/>
+        </p:nvSpPr>
+        <p:spPr>
+          <a:xfrm>
+            <a:off x="1547321" y="2316680"/>
+            <a:ext cx="1095172" cy="369332"/>
           </a:xfrm>
           <a:prstGeom prst="rect">
             <a:avLst/>
           </a:prstGeom>
           <a:noFill/>
-          <a:ln>
-            <a:noFill/>
-          </a:ln>
-          <a:extLst>
-            <a:ext uri="{909E8E84-426E-40DD-AFC4-6F175D3DCCD1}">
-              <a14:hiddenFill xmlns:a14="http://schemas.microsoft.com/office/drawing/2010/main">
-                <a:solidFill>
-                  <a:srgbClr val="FFFFFF"/>
-                </a:solidFill>
-              </a14:hiddenFill>
-            </a:ext>
-            <a:ext uri="{91240B29-F687-4F45-9708-019B960494DF}">
-              <a14:hiddenLine xmlns:a14="http://schemas.microsoft.com/office/drawing/2010/main" w="9525">
-                <a:solidFill>
-                  <a:srgbClr val="000000"/>
-                </a:solidFill>
-                <a:miter lim="800000"/>
-                <a:headEnd/>
-                <a:tailEnd/>
-              </a14:hiddenLine>
-            </a:ext>
-          </a:extLst>
         </p:spPr>
-      </p:pic>
+        <p:txBody>
+          <a:bodyPr wrap="none" rtlCol="0">
+            <a:spAutoFit/>
+          </a:bodyPr>
+          <a:lstStyle/>
+          <a:p>
+            <a:r>
+              <a:rPr lang="en-IE" dirty="0" err="1"/>
+              <a:t>index.tsx</a:t>
+            </a:r>
+            <a:endParaRPr lang="en-IE" dirty="0"/>
+          </a:p>
+        </p:txBody>
+      </p:sp>
+      <p:sp>
+        <p:nvSpPr>
+          <p:cNvPr id="14" name="TextBox 13">
+            <a:extLst>
+              <a:ext uri="{FF2B5EF4-FFF2-40B4-BE49-F238E27FC236}">
+                <a16:creationId xmlns:a16="http://schemas.microsoft.com/office/drawing/2014/main" id="{235014CF-87D6-AFF3-8A02-3EA5D4581BED}"/>
+              </a:ext>
+            </a:extLst>
+          </p:cNvPr>
+          <p:cNvSpPr txBox="1"/>
+          <p:nvPr/>
+        </p:nvSpPr>
+        <p:spPr>
+          <a:xfrm>
+            <a:off x="7424567" y="2193494"/>
+            <a:ext cx="2672526" cy="369332"/>
+          </a:xfrm>
+          <a:prstGeom prst="rect">
+            <a:avLst/>
+          </a:prstGeom>
+          <a:noFill/>
+        </p:spPr>
+        <p:txBody>
+          <a:bodyPr wrap="none" rtlCol="0">
+            <a:spAutoFit/>
+          </a:bodyPr>
+          <a:lstStyle/>
+          <a:p>
+            <a:r>
+              <a:rPr lang="en-IE" dirty="0" err="1"/>
+              <a:t>demoComponent.tsc.tsx</a:t>
+            </a:r>
+            <a:endParaRPr lang="en-IE" dirty="0"/>
+          </a:p>
+        </p:txBody>
+      </p:sp>
+      <mc:AlternateContent xmlns:mc="http://schemas.openxmlformats.org/markup-compatibility/2006">
+        <mc:Choice xmlns:p14="http://schemas.microsoft.com/office/powerpoint/2010/main" Requires="p14">
+          <p:contentPart p14:bwMode="auto" r:id="rId7">
+            <p14:nvContentPartPr>
+              <p14:cNvPr id="19" name="Ink 18">
+                <a:extLst>
+                  <a:ext uri="{FF2B5EF4-FFF2-40B4-BE49-F238E27FC236}">
+                    <a16:creationId xmlns:a16="http://schemas.microsoft.com/office/drawing/2014/main" id="{06FE1469-6201-0053-00D1-EF8DD9075ACB}"/>
+                  </a:ext>
+                </a:extLst>
+              </p14:cNvPr>
+              <p14:cNvContentPartPr/>
+              <p14:nvPr/>
+            </p14:nvContentPartPr>
+            <p14:xfrm>
+              <a:off x="2136530" y="4821558"/>
+              <a:ext cx="1440" cy="360"/>
+            </p14:xfrm>
+          </p:contentPart>
+        </mc:Choice>
+        <mc:Fallback>
+          <p:pic>
+            <p:nvPicPr>
+              <p:cNvPr id="19" name="Ink 18">
+                <a:extLst>
+                  <a:ext uri="{FF2B5EF4-FFF2-40B4-BE49-F238E27FC236}">
+                    <a16:creationId xmlns:a16="http://schemas.microsoft.com/office/drawing/2014/main" id="{06FE1469-6201-0053-00D1-EF8DD9075ACB}"/>
+                  </a:ext>
+                </a:extLst>
+              </p:cNvPr>
+              <p:cNvPicPr/>
+              <p:nvPr/>
+            </p:nvPicPr>
+            <p:blipFill>
+              <a:blip r:embed="rId8"/>
+              <a:stretch>
+                <a:fillRect/>
+              </a:stretch>
+            </p:blipFill>
+            <p:spPr>
+              <a:xfrm>
+                <a:off x="2127890" y="4812918"/>
+                <a:ext cx="19080" cy="18000"/>
+              </a:xfrm>
+              <a:prstGeom prst="rect">
+                <a:avLst/>
+              </a:prstGeom>
+            </p:spPr>
+          </p:pic>
+        </mc:Fallback>
+      </mc:AlternateContent>
+      <mc:AlternateContent xmlns:mc="http://schemas.openxmlformats.org/markup-compatibility/2006">
+        <mc:Choice xmlns:p14="http://schemas.microsoft.com/office/powerpoint/2010/main" Requires="p14">
+          <p:contentPart p14:bwMode="auto" r:id="rId9">
+            <p14:nvContentPartPr>
+              <p14:cNvPr id="20" name="Ink 19">
+                <a:extLst>
+                  <a:ext uri="{FF2B5EF4-FFF2-40B4-BE49-F238E27FC236}">
+                    <a16:creationId xmlns:a16="http://schemas.microsoft.com/office/drawing/2014/main" id="{AEDB8A9B-E0F8-F2A3-F57D-423A64914E7E}"/>
+                  </a:ext>
+                </a:extLst>
+              </p14:cNvPr>
+              <p14:cNvContentPartPr/>
+              <p14:nvPr/>
+            </p14:nvContentPartPr>
+            <p14:xfrm>
+              <a:off x="3822050" y="1966038"/>
+              <a:ext cx="6466680" cy="1362960"/>
+            </p14:xfrm>
+          </p:contentPart>
+        </mc:Choice>
+        <mc:Fallback>
+          <p:pic>
+            <p:nvPicPr>
+              <p:cNvPr id="20" name="Ink 19">
+                <a:extLst>
+                  <a:ext uri="{FF2B5EF4-FFF2-40B4-BE49-F238E27FC236}">
+                    <a16:creationId xmlns:a16="http://schemas.microsoft.com/office/drawing/2014/main" id="{AEDB8A9B-E0F8-F2A3-F57D-423A64914E7E}"/>
+                  </a:ext>
+                </a:extLst>
+              </p:cNvPr>
+              <p:cNvPicPr/>
+              <p:nvPr/>
+            </p:nvPicPr>
+            <p:blipFill>
+              <a:blip r:embed="rId10"/>
+              <a:stretch>
+                <a:fillRect/>
+              </a:stretch>
+            </p:blipFill>
+            <p:spPr>
+              <a:xfrm>
+                <a:off x="3813050" y="1957038"/>
+                <a:ext cx="6484320" cy="1380600"/>
+              </a:xfrm>
+              <a:prstGeom prst="rect">
+                <a:avLst/>
+              </a:prstGeom>
+            </p:spPr>
+          </p:pic>
+        </mc:Fallback>
+      </mc:AlternateContent>
+      <mc:AlternateContent xmlns:mc="http://schemas.openxmlformats.org/markup-compatibility/2006">
+        <mc:Choice xmlns:p14="http://schemas.microsoft.com/office/powerpoint/2010/main" Requires="p14">
+          <p:contentPart p14:bwMode="auto" r:id="rId11">
+            <p14:nvContentPartPr>
+              <p14:cNvPr id="21" name="Ink 20">
+                <a:extLst>
+                  <a:ext uri="{FF2B5EF4-FFF2-40B4-BE49-F238E27FC236}">
+                    <a16:creationId xmlns:a16="http://schemas.microsoft.com/office/drawing/2014/main" id="{A882EFF3-D81B-865B-515C-7777A64427D9}"/>
+                  </a:ext>
+                </a:extLst>
+              </p14:cNvPr>
+              <p14:cNvContentPartPr/>
+              <p14:nvPr/>
+            </p14:nvContentPartPr>
+            <p14:xfrm>
+              <a:off x="6940010" y="2835078"/>
+              <a:ext cx="3499920" cy="949320"/>
+            </p14:xfrm>
+          </p:contentPart>
+        </mc:Choice>
+        <mc:Fallback>
+          <p:pic>
+            <p:nvPicPr>
+              <p:cNvPr id="21" name="Ink 20">
+                <a:extLst>
+                  <a:ext uri="{FF2B5EF4-FFF2-40B4-BE49-F238E27FC236}">
+                    <a16:creationId xmlns:a16="http://schemas.microsoft.com/office/drawing/2014/main" id="{A882EFF3-D81B-865B-515C-7777A64427D9}"/>
+                  </a:ext>
+                </a:extLst>
+              </p:cNvPr>
+              <p:cNvPicPr/>
+              <p:nvPr/>
+            </p:nvPicPr>
+            <p:blipFill>
+              <a:blip r:embed="rId12"/>
+              <a:stretch>
+                <a:fillRect/>
+              </a:stretch>
+            </p:blipFill>
+            <p:spPr>
+              <a:xfrm>
+                <a:off x="6931370" y="2826078"/>
+                <a:ext cx="3517560" cy="966960"/>
+              </a:xfrm>
+              <a:prstGeom prst="rect">
+                <a:avLst/>
+              </a:prstGeom>
+            </p:spPr>
+          </p:pic>
+        </mc:Fallback>
+      </mc:AlternateContent>
     </p:spTree>
   </p:cSld>
   <p:clrMapOvr>
@@ -10066,13 +10207,13 @@
                     </p:cTn>
                   </p:par>
                   <p:par>
-                    <p:cTn id="7" fill="hold" nodeType="clickPar">
+                    <p:cTn id="7" fill="hold">
                       <p:stCondLst>
                         <p:cond delay="indefinite"/>
                       </p:stCondLst>
                       <p:childTnLst>
                         <p:par>
-                          <p:cTn id="8" fill="hold" nodeType="withGroup">
+                          <p:cTn id="8" fill="hold">
                             <p:stCondLst>
                               <p:cond delay="0"/>
                             </p:stCondLst>
@@ -10091,7 +10232,11 @@
                                           </p:stCondLst>
                                         </p:cTn>
                                         <p:tgtEl>
-                                          <p:spTgt spid="15"/>
+                                          <p:spTgt spid="19457">
+                                            <p:txEl>
+                                              <p:pRg st="8" end="8"/>
+                                            </p:txEl>
+                                          </p:spTgt>
                                         </p:tgtEl>
                                         <p:attrNameLst>
                                           <p:attrName>style.visibility</p:attrName>
@@ -10136,7 +10281,11 @@
                                           </p:stCondLst>
                                         </p:cTn>
                                         <p:tgtEl>
-                                          <p:spTgt spid="6"/>
+                                          <p:spTgt spid="19457">
+                                            <p:txEl>
+                                              <p:pRg st="9" end="9"/>
+                                            </p:txEl>
+                                          </p:spTgt>
                                         </p:tgtEl>
                                         <p:attrNameLst>
                                           <p:attrName>style.visibility</p:attrName>
@@ -10183,56 +10332,7 @@
                                         <p:tgtEl>
                                           <p:spTgt spid="19457">
                                             <p:txEl>
-                                              <p:pRg st="8" end="8"/>
-                                            </p:txEl>
-                                          </p:spTgt>
-                                        </p:tgtEl>
-                                        <p:attrNameLst>
-                                          <p:attrName>style.visibility</p:attrName>
-                                        </p:attrNameLst>
-                                      </p:cBhvr>
-                                      <p:to>
-                                        <p:strVal val="visible"/>
-                                      </p:to>
-                                    </p:set>
-                                  </p:childTnLst>
-                                </p:cTn>
-                              </p:par>
-                            </p:childTnLst>
-                          </p:cTn>
-                        </p:par>
-                      </p:childTnLst>
-                    </p:cTn>
-                  </p:par>
-                  <p:par>
-                    <p:cTn id="19" fill="hold" nodeType="clickPar">
-                      <p:stCondLst>
-                        <p:cond delay="indefinite"/>
-                      </p:stCondLst>
-                      <p:childTnLst>
-                        <p:par>
-                          <p:cTn id="20" fill="hold" nodeType="withGroup">
-                            <p:stCondLst>
-                              <p:cond delay="0"/>
-                            </p:stCondLst>
-                            <p:childTnLst>
-                              <p:par>
-                                <p:cTn id="21" presetID="1" presetClass="entr" presetSubtype="0" fill="hold" nodeType="clickEffect">
-                                  <p:stCondLst>
-                                    <p:cond delay="0"/>
-                                  </p:stCondLst>
-                                  <p:childTnLst>
-                                    <p:set>
-                                      <p:cBhvr>
-                                        <p:cTn id="22" dur="1" fill="hold">
-                                          <p:stCondLst>
-                                            <p:cond delay="0"/>
-                                          </p:stCondLst>
-                                        </p:cTn>
-                                        <p:tgtEl>
-                                          <p:spTgt spid="19457">
-                                            <p:txEl>
-                                              <p:pRg st="9" end="9"/>
+                                              <p:pRg st="10" end="10"/>
                                             </p:txEl>
                                           </p:spTgt>
                                         </p:tgtEl>
@@ -10537,7 +10637,7 @@
           </p:cNvPicPr>
           <p:nvPr/>
         </p:nvPicPr>
-        <p:blipFill>
+        <p:blipFill rotWithShape="1">
           <a:blip r:embed="rId2">
             <a:extLst>
               <a:ext uri="{28A0092B-C50C-407E-A947-70E740481C1C}">
@@ -10545,15 +10645,13 @@
               </a:ext>
             </a:extLst>
           </a:blip>
-          <a:srcRect/>
-          <a:stretch>
-            <a:fillRect/>
-          </a:stretch>
+          <a:srcRect t="11624"/>
+          <a:stretch/>
         </p:blipFill>
         <p:spPr bwMode="auto">
           <a:xfrm>
-            <a:off x="2235200" y="227013"/>
-            <a:ext cx="3454400" cy="2063750"/>
+            <a:off x="2235200" y="457199"/>
+            <a:ext cx="3454400" cy="1852815"/>
           </a:xfrm>
           <a:prstGeom prst="rect">
             <a:avLst/>
@@ -10717,7 +10815,7 @@
           </p:cNvPicPr>
           <p:nvPr/>
         </p:nvPicPr>
-        <p:blipFill>
+        <p:blipFill rotWithShape="1">
           <a:blip r:embed="rId3">
             <a:extLst>
               <a:ext uri="{28A0092B-C50C-407E-A947-70E740481C1C}">
@@ -10725,15 +10823,13 @@
               </a:ext>
             </a:extLst>
           </a:blip>
-          <a:srcRect/>
-          <a:stretch>
-            <a:fillRect/>
-          </a:stretch>
+          <a:srcRect t="15834"/>
+          <a:stretch/>
         </p:blipFill>
         <p:spPr bwMode="auto">
           <a:xfrm>
-            <a:off x="2324100" y="2339975"/>
-            <a:ext cx="3302000" cy="2065338"/>
+            <a:off x="2324100" y="2666999"/>
+            <a:ext cx="3302000" cy="1738313"/>
           </a:xfrm>
           <a:prstGeom prst="rect">
             <a:avLst/>
@@ -10897,7 +10993,7 @@
           </p:cNvPicPr>
           <p:nvPr/>
         </p:nvPicPr>
-        <p:blipFill>
+        <p:blipFill rotWithShape="1">
           <a:blip r:embed="rId4">
             <a:extLst>
               <a:ext uri="{28A0092B-C50C-407E-A947-70E740481C1C}">
@@ -10905,15 +11001,13 @@
               </a:ext>
             </a:extLst>
           </a:blip>
-          <a:srcRect/>
-          <a:stretch>
-            <a:fillRect/>
-          </a:stretch>
+          <a:srcRect t="9165"/>
+          <a:stretch/>
         </p:blipFill>
         <p:spPr bwMode="auto">
           <a:xfrm>
-            <a:off x="2311400" y="4452939"/>
-            <a:ext cx="3327400" cy="2130425"/>
+            <a:off x="2311400" y="4648200"/>
+            <a:ext cx="3327400" cy="1935164"/>
           </a:xfrm>
           <a:prstGeom prst="rect">
             <a:avLst/>
@@ -13547,66 +13641,6 @@
       </p:sp>
       <p:pic>
         <p:nvPicPr>
-          <p:cNvPr id="23554" name="Picture 2">
-            <a:extLst>
-              <a:ext uri="{FF2B5EF4-FFF2-40B4-BE49-F238E27FC236}">
-                <a16:creationId xmlns:a16="http://schemas.microsoft.com/office/drawing/2014/main" id="{D0166038-B9ED-F6A1-42E4-0C41BB7D99CB}"/>
-              </a:ext>
-            </a:extLst>
-          </p:cNvPr>
-          <p:cNvPicPr>
-            <a:picLocks noChangeAspect="1" noChangeArrowheads="1"/>
-          </p:cNvPicPr>
-          <p:nvPr/>
-        </p:nvPicPr>
-        <p:blipFill>
-          <a:blip r:embed="rId2">
-            <a:extLst>
-              <a:ext uri="{28A0092B-C50C-407E-A947-70E740481C1C}">
-                <a14:useLocalDpi xmlns:a14="http://schemas.microsoft.com/office/drawing/2010/main" val="0"/>
-              </a:ext>
-            </a:extLst>
-          </a:blip>
-          <a:srcRect/>
-          <a:stretch>
-            <a:fillRect/>
-          </a:stretch>
-        </p:blipFill>
-        <p:spPr bwMode="auto">
-          <a:xfrm>
-            <a:off x="1978026" y="2051050"/>
-            <a:ext cx="4627563" cy="2730500"/>
-          </a:xfrm>
-          <a:prstGeom prst="rect">
-            <a:avLst/>
-          </a:prstGeom>
-          <a:noFill/>
-          <a:ln>
-            <a:noFill/>
-          </a:ln>
-          <a:extLst>
-            <a:ext uri="{909E8E84-426E-40DD-AFC4-6F175D3DCCD1}">
-              <a14:hiddenFill xmlns:a14="http://schemas.microsoft.com/office/drawing/2010/main">
-                <a:solidFill>
-                  <a:srgbClr val="FFFFFF"/>
-                </a:solidFill>
-              </a14:hiddenFill>
-            </a:ext>
-            <a:ext uri="{91240B29-F687-4F45-9708-019B960494DF}">
-              <a14:hiddenLine xmlns:a14="http://schemas.microsoft.com/office/drawing/2010/main" w="9525">
-                <a:solidFill>
-                  <a:srgbClr val="000000"/>
-                </a:solidFill>
-                <a:miter lim="800000"/>
-                <a:headEnd/>
-                <a:tailEnd/>
-              </a14:hiddenLine>
-            </a:ext>
-          </a:extLst>
-        </p:spPr>
-      </p:pic>
-      <p:pic>
-        <p:nvPicPr>
           <p:cNvPr id="23555" name="Picture 8">
             <a:extLst>
               <a:ext uri="{FF2B5EF4-FFF2-40B4-BE49-F238E27FC236}">
@@ -13620,7 +13654,7 @@
           <p:nvPr/>
         </p:nvPicPr>
         <p:blipFill>
-          <a:blip r:embed="rId3">
+          <a:blip r:embed="rId2">
             <a:extLst>
               <a:ext uri="{28A0092B-C50C-407E-A947-70E740481C1C}">
                 <a14:useLocalDpi xmlns:a14="http://schemas.microsoft.com/office/drawing/2010/main" val="0"/>
@@ -13680,7 +13714,7 @@
           <p:nvPr/>
         </p:nvPicPr>
         <p:blipFill>
-          <a:blip r:embed="rId4">
+          <a:blip r:embed="rId3">
             <a:extLst>
               <a:ext uri="{28A0092B-C50C-407E-A947-70E740481C1C}">
                 <a14:useLocalDpi xmlns:a14="http://schemas.microsoft.com/office/drawing/2010/main" val="0"/>
@@ -13739,7 +13773,7 @@
         </p:nvSpPr>
         <p:spPr>
           <a:xfrm>
-            <a:off x="6862764" y="831850"/>
+            <a:off x="7620000" y="337311"/>
             <a:ext cx="3354387" cy="2139950"/>
           </a:xfrm>
           <a:prstGeom prst="rect">
@@ -13849,6 +13883,189 @@
           </a:p>
         </p:txBody>
       </p:sp>
+      <p:pic>
+        <p:nvPicPr>
+          <p:cNvPr id="3" name="Picture 2">
+            <a:extLst>
+              <a:ext uri="{FF2B5EF4-FFF2-40B4-BE49-F238E27FC236}">
+                <a16:creationId xmlns:a16="http://schemas.microsoft.com/office/drawing/2014/main" id="{DBF2EBCF-86B2-6329-4700-491DD595FC0D}"/>
+              </a:ext>
+            </a:extLst>
+          </p:cNvPr>
+          <p:cNvPicPr>
+            <a:picLocks noChangeAspect="1"/>
+          </p:cNvPicPr>
+          <p:nvPr/>
+        </p:nvPicPr>
+        <p:blipFill>
+          <a:blip r:embed="rId4"/>
+          <a:stretch>
+            <a:fillRect/>
+          </a:stretch>
+        </p:blipFill>
+        <p:spPr>
+          <a:xfrm>
+            <a:off x="1929394" y="2667000"/>
+            <a:ext cx="9352388" cy="1609444"/>
+          </a:xfrm>
+          <a:prstGeom prst="rect">
+            <a:avLst/>
+          </a:prstGeom>
+        </p:spPr>
+      </p:pic>
+      <mc:AlternateContent xmlns:mc="http://schemas.openxmlformats.org/markup-compatibility/2006">
+        <mc:Choice xmlns:p14="http://schemas.microsoft.com/office/powerpoint/2010/main" Requires="p14">
+          <p:contentPart p14:bwMode="auto" r:id="rId5">
+            <p14:nvContentPartPr>
+              <p14:cNvPr id="4" name="Ink 3">
+                <a:extLst>
+                  <a:ext uri="{FF2B5EF4-FFF2-40B4-BE49-F238E27FC236}">
+                    <a16:creationId xmlns:a16="http://schemas.microsoft.com/office/drawing/2014/main" id="{3F84BB08-8EAA-F307-6FF0-A4F9B6536FB3}"/>
+                  </a:ext>
+                </a:extLst>
+              </p14:cNvPr>
+              <p14:cNvContentPartPr/>
+              <p14:nvPr/>
+            </p14:nvContentPartPr>
+            <p14:xfrm>
+              <a:off x="2443582" y="3108087"/>
+              <a:ext cx="1658880" cy="523080"/>
+            </p14:xfrm>
+          </p:contentPart>
+        </mc:Choice>
+        <mc:Fallback>
+          <p:pic>
+            <p:nvPicPr>
+              <p:cNvPr id="4" name="Ink 3">
+                <a:extLst>
+                  <a:ext uri="{FF2B5EF4-FFF2-40B4-BE49-F238E27FC236}">
+                    <a16:creationId xmlns:a16="http://schemas.microsoft.com/office/drawing/2014/main" id="{3F84BB08-8EAA-F307-6FF0-A4F9B6536FB3}"/>
+                  </a:ext>
+                </a:extLst>
+              </p:cNvPr>
+              <p:cNvPicPr/>
+              <p:nvPr/>
+            </p:nvPicPr>
+            <p:blipFill>
+              <a:blip r:embed="rId6"/>
+              <a:stretch>
+                <a:fillRect/>
+              </a:stretch>
+            </p:blipFill>
+            <p:spPr>
+              <a:xfrm>
+                <a:off x="2434942" y="3099447"/>
+                <a:ext cx="1676520" cy="540720"/>
+              </a:xfrm>
+              <a:prstGeom prst="rect">
+                <a:avLst/>
+              </a:prstGeom>
+            </p:spPr>
+          </p:pic>
+        </mc:Fallback>
+      </mc:AlternateContent>
+      <mc:AlternateContent xmlns:mc="http://schemas.openxmlformats.org/markup-compatibility/2006">
+        <mc:Choice xmlns:p14="http://schemas.microsoft.com/office/powerpoint/2010/main" Requires="p14">
+          <p:contentPart p14:bwMode="auto" r:id="rId7">
+            <p14:nvContentPartPr>
+              <p14:cNvPr id="6" name="Ink 5">
+                <a:extLst>
+                  <a:ext uri="{FF2B5EF4-FFF2-40B4-BE49-F238E27FC236}">
+                    <a16:creationId xmlns:a16="http://schemas.microsoft.com/office/drawing/2014/main" id="{CB0E92C5-2EC3-1B71-B8C7-40C6B7AE66F3}"/>
+                  </a:ext>
+                </a:extLst>
+              </p14:cNvPr>
+              <p14:cNvContentPartPr/>
+              <p14:nvPr/>
+            </p14:nvContentPartPr>
+            <p14:xfrm>
+              <a:off x="1900702" y="1319967"/>
+              <a:ext cx="433080" cy="73080"/>
+            </p14:xfrm>
+          </p:contentPart>
+        </mc:Choice>
+        <mc:Fallback>
+          <p:pic>
+            <p:nvPicPr>
+              <p:cNvPr id="6" name="Ink 5">
+                <a:extLst>
+                  <a:ext uri="{FF2B5EF4-FFF2-40B4-BE49-F238E27FC236}">
+                    <a16:creationId xmlns:a16="http://schemas.microsoft.com/office/drawing/2014/main" id="{CB0E92C5-2EC3-1B71-B8C7-40C6B7AE66F3}"/>
+                  </a:ext>
+                </a:extLst>
+              </p:cNvPr>
+              <p:cNvPicPr/>
+              <p:nvPr/>
+            </p:nvPicPr>
+            <p:blipFill>
+              <a:blip r:embed="rId8"/>
+              <a:stretch>
+                <a:fillRect/>
+              </a:stretch>
+            </p:blipFill>
+            <p:spPr>
+              <a:xfrm>
+                <a:off x="1891702" y="1311327"/>
+                <a:ext cx="450720" cy="90720"/>
+              </a:xfrm>
+              <a:prstGeom prst="rect">
+                <a:avLst/>
+              </a:prstGeom>
+            </p:spPr>
+          </p:pic>
+        </mc:Fallback>
+      </mc:AlternateContent>
+      <mc:AlternateContent xmlns:mc="http://schemas.openxmlformats.org/markup-compatibility/2006">
+        <mc:Choice xmlns:p14="http://schemas.microsoft.com/office/powerpoint/2010/main" Requires="p14">
+          <p:contentPart p14:bwMode="auto" r:id="rId9">
+            <p14:nvContentPartPr>
+              <p14:cNvPr id="7" name="Ink 6">
+                <a:extLst>
+                  <a:ext uri="{FF2B5EF4-FFF2-40B4-BE49-F238E27FC236}">
+                    <a16:creationId xmlns:a16="http://schemas.microsoft.com/office/drawing/2014/main" id="{021E508D-150E-A209-13AC-2CF9397DCD28}"/>
+                  </a:ext>
+                </a:extLst>
+              </p14:cNvPr>
+              <p14:cNvContentPartPr/>
+              <p14:nvPr/>
+            </p14:nvContentPartPr>
+            <p14:xfrm>
+              <a:off x="1778662" y="5467167"/>
+              <a:ext cx="410040" cy="109440"/>
+            </p14:xfrm>
+          </p:contentPart>
+        </mc:Choice>
+        <mc:Fallback>
+          <p:pic>
+            <p:nvPicPr>
+              <p:cNvPr id="7" name="Ink 6">
+                <a:extLst>
+                  <a:ext uri="{FF2B5EF4-FFF2-40B4-BE49-F238E27FC236}">
+                    <a16:creationId xmlns:a16="http://schemas.microsoft.com/office/drawing/2014/main" id="{021E508D-150E-A209-13AC-2CF9397DCD28}"/>
+                  </a:ext>
+                </a:extLst>
+              </p:cNvPr>
+              <p:cNvPicPr/>
+              <p:nvPr/>
+            </p:nvPicPr>
+            <p:blipFill>
+              <a:blip r:embed="rId10"/>
+              <a:stretch>
+                <a:fillRect/>
+              </a:stretch>
+            </p:blipFill>
+            <p:spPr>
+              <a:xfrm>
+                <a:off x="1770022" y="5458527"/>
+                <a:ext cx="427680" cy="127080"/>
+              </a:xfrm>
+              <a:prstGeom prst="rect">
+                <a:avLst/>
+              </a:prstGeom>
+            </p:spPr>
+          </p:pic>
+        </mc:Fallback>
+      </mc:AlternateContent>
     </p:spTree>
   </p:cSld>
   <p:clrMapOvr>

</xml_diff>